<commit_message>
Visual changes to presentation slides
</commit_message>
<xml_diff>
--- a/Capstone Project Phase A–23-2-D-17.pptx
+++ b/Capstone Project Phase A–23-2-D-17.pptx
@@ -219,7 +219,7 @@
           <a:p>
             <a:fld id="{2442D881-CA12-4970-8156-2388B9CD2E9F}" type="datetimeFigureOut">
               <a:rPr lang="en-IL" smtClean="0"/>
-              <a:t>06/25/2023</a:t>
+              <a:t>25/06/2023</a:t>
             </a:fld>
             <a:endParaRPr lang="en-IL"/>
           </a:p>
@@ -1552,12 +1552,6 @@
           <a:bodyPr/>
           <a:lstStyle/>
           <a:p>
-            <a:br>
-              <a:rPr lang="en-US" dirty="0"/>
-            </a:br>
-            <a:endParaRPr lang="en-US" dirty="0"/>
-          </a:p>
-          <a:p>
             <a:endParaRPr lang="en-IL" dirty="0"/>
           </a:p>
         </p:txBody>
@@ -2101,12 +2095,6 @@
         <p:txBody>
           <a:bodyPr/>
           <a:lstStyle/>
-          <a:p>
-            <a:endParaRPr lang="en-US" dirty="0"/>
-          </a:p>
-          <a:p>
-            <a:endParaRPr lang="en-US" dirty="0"/>
-          </a:p>
           <a:p>
             <a:endParaRPr lang="en-IL" dirty="0"/>
           </a:p>
@@ -5509,7 +5497,7 @@
               <a:tabLst/>
             </a:pPr>
             <a:r>
-              <a:rPr kumimoji="0" lang="en-US" altLang="en-IL" sz="3200" b="0" i="0" u="none" strike="noStrike" cap="none" normalizeH="0" baseline="0">
+              <a:rPr kumimoji="0" lang="en-US" altLang="en-IL" sz="3200" b="1" i="0" u="none" strike="noStrike" cap="none" normalizeH="0" baseline="0" dirty="0">
                 <a:ln>
                   <a:noFill/>
                 </a:ln>
@@ -5524,7 +5512,7 @@
               <a:t>FEASIBILITY ANALYSIS AND PERFORMANCE</a:t>
             </a:r>
             <a:br>
-              <a:rPr kumimoji="0" lang="en-US" altLang="en-IL" sz="3200" b="0" i="0" u="none" strike="noStrike" cap="none" normalizeH="0" baseline="0">
+              <a:rPr kumimoji="0" lang="en-US" altLang="en-IL" sz="3200" b="1" i="0" u="none" strike="noStrike" cap="none" normalizeH="0" baseline="0" dirty="0">
                 <a:ln>
                   <a:noFill/>
                 </a:ln>
@@ -5538,7 +5526,7 @@
               </a:rPr>
             </a:br>
             <a:r>
-              <a:rPr kumimoji="0" lang="en-US" altLang="en-IL" sz="3200" b="0" i="0" u="none" strike="noStrike" cap="none" normalizeH="0" baseline="0">
+              <a:rPr kumimoji="0" lang="en-US" altLang="en-IL" sz="3200" b="1" i="0" u="none" strike="noStrike" cap="none" normalizeH="0" baseline="0" dirty="0">
                 <a:ln>
                   <a:noFill/>
                 </a:ln>
@@ -5553,7 +5541,7 @@
               <a:t> TESTING OF COLLISION DETECTION</a:t>
             </a:r>
             <a:br>
-              <a:rPr kumimoji="0" lang="en-US" altLang="en-IL" sz="3200" b="0" i="0" u="none" strike="noStrike" cap="none" normalizeH="0" baseline="0">
+              <a:rPr kumimoji="0" lang="en-US" altLang="en-IL" sz="3200" b="1" i="0" u="none" strike="noStrike" cap="none" normalizeH="0" baseline="0" dirty="0">
                 <a:ln>
                   <a:noFill/>
                 </a:ln>
@@ -5567,7 +5555,7 @@
               </a:rPr>
             </a:br>
             <a:r>
-              <a:rPr kumimoji="0" lang="en-US" altLang="en-IL" sz="3200" b="0" i="0" u="none" strike="noStrike" cap="none" normalizeH="0" baseline="0">
+              <a:rPr kumimoji="0" lang="en-US" altLang="en-IL" sz="3200" b="1" i="0" u="none" strike="noStrike" cap="none" normalizeH="0" baseline="0" dirty="0">
                 <a:ln>
                   <a:noFill/>
                 </a:ln>
@@ -5581,7 +5569,7 @@
               </a:rPr>
               <a:t> ALGORITHMS FOR SATELLITES</a:t>
             </a:r>
-            <a:endParaRPr kumimoji="0" lang="en-US" altLang="en-IL" sz="2400" b="0" i="0" u="none" strike="noStrike" cap="none" normalizeH="0" baseline="0">
+            <a:endParaRPr kumimoji="0" lang="en-US" altLang="en-IL" sz="2400" b="1" i="0" u="none" strike="noStrike" cap="none" normalizeH="0" baseline="0" dirty="0">
               <a:ln>
                 <a:noFill/>
               </a:ln>
@@ -5617,7 +5605,7 @@
           <a:lstStyle/>
           <a:p>
             <a:r>
-              <a:rPr lang="en-US" sz="4300" kern="100">
+              <a:rPr lang="en-US" sz="4300" b="1" kern="100" dirty="0">
                 <a:solidFill>
                   <a:srgbClr val="4472C4"/>
                 </a:solidFill>
@@ -5628,7 +5616,7 @@
               </a:rPr>
               <a:t>Capstone Project Phase A</a:t>
             </a:r>
-            <a:endParaRPr lang="en-IL" sz="4300" kern="100">
+            <a:endParaRPr lang="en-IL" sz="4300" b="1" kern="100" dirty="0">
               <a:effectLst/>
               <a:latin typeface="Calibri" panose="020F0502020204030204" pitchFamily="34" charset="0"/>
               <a:ea typeface="Calibri" panose="020F0502020204030204" pitchFamily="34" charset="0"/>
@@ -5830,7 +5818,7 @@
           </a:lstStyle>
           <a:p>
             <a:r>
-              <a:rPr kumimoji="0" lang="en-US" altLang="en-IL" sz="2000" b="0" i="0" u="none" strike="noStrike" cap="none" normalizeH="0" baseline="0">
+              <a:rPr kumimoji="0" lang="en-US" altLang="en-IL" sz="2000" b="1" i="0" u="none" strike="noStrike" cap="none" normalizeH="0" baseline="0" dirty="0">
                 <a:ln>
                   <a:noFill/>
                 </a:ln>
@@ -5844,7 +5832,7 @@
               </a:rPr>
               <a:t>23-2-D-17</a:t>
             </a:r>
-            <a:endParaRPr lang="en-US"/>
+            <a:endParaRPr lang="en-US" b="1" dirty="0"/>
           </a:p>
         </p:txBody>
       </p:sp>
@@ -6041,7 +6029,7 @@
           </a:lstStyle>
           <a:p>
             <a:r>
-              <a:rPr lang="en-US" sz="4300" kern="100">
+              <a:rPr lang="en-US" sz="4300" kern="100" dirty="0">
                 <a:solidFill>
                   <a:srgbClr val="4472C4"/>
                 </a:solidFill>
@@ -6051,7 +6039,7 @@
               </a:rPr>
               <a:t>Hallel Weil</a:t>
             </a:r>
-            <a:endParaRPr lang="en-IL" sz="4300" kern="100">
+            <a:endParaRPr lang="en-IL" sz="4300" kern="100" dirty="0">
               <a:latin typeface="Calibri" panose="020F0502020204030204" pitchFamily="34" charset="0"/>
               <a:ea typeface="Calibri" panose="020F0502020204030204" pitchFamily="34" charset="0"/>
               <a:cs typeface="Arial" panose="020B0604020202020204" pitchFamily="34" charset="0"/>
@@ -6581,7 +6569,7 @@
           </a:lstStyle>
           <a:p>
             <a:r>
-              <a:rPr lang="en-US" sz="4800">
+              <a:rPr lang="en-US" sz="4800" b="1" dirty="0">
                 <a:solidFill>
                   <a:srgbClr val="4472C4"/>
                 </a:solidFill>
@@ -6591,7 +6579,7 @@
               </a:rPr>
               <a:t>Solution</a:t>
             </a:r>
-            <a:endParaRPr lang="en-US" sz="4800">
+            <a:endParaRPr lang="en-US" sz="4800" b="1" dirty="0">
               <a:solidFill>
                 <a:srgbClr val="4472C4"/>
               </a:solidFill>
@@ -8307,7 +8295,7 @@
           <a:lstStyle/>
           <a:p>
             <a:r>
-              <a:rPr lang="en-US" sz="4800">
+              <a:rPr lang="en-US" sz="4800" b="1" dirty="0">
                 <a:solidFill>
                   <a:srgbClr val="4472C4"/>
                 </a:solidFill>
@@ -8317,7 +8305,7 @@
               </a:rPr>
               <a:t>Solution</a:t>
             </a:r>
-            <a:endParaRPr lang="en-US" sz="4800">
+            <a:endParaRPr lang="en-US" sz="4800" b="1" dirty="0">
               <a:solidFill>
                 <a:srgbClr val="4472C4"/>
               </a:solidFill>
@@ -9778,7 +9766,7 @@
           <a:lstStyle/>
           <a:p>
             <a:r>
-              <a:rPr lang="en-US" sz="4800">
+              <a:rPr lang="en-US" sz="4800" b="1" dirty="0">
                 <a:solidFill>
                   <a:srgbClr val="4472C4"/>
                 </a:solidFill>
@@ -9788,7 +9776,7 @@
               </a:rPr>
               <a:t>Solution</a:t>
             </a:r>
-            <a:endParaRPr lang="en-US" sz="4800">
+            <a:endParaRPr lang="en-US" sz="4800" b="1" dirty="0">
               <a:solidFill>
                 <a:srgbClr val="4472C4"/>
               </a:solidFill>
@@ -11443,7 +11431,7 @@
           <a:lstStyle/>
           <a:p>
             <a:r>
-              <a:rPr lang="en-US" sz="4800">
+              <a:rPr lang="en-US" sz="4800" b="1" dirty="0">
                 <a:solidFill>
                   <a:srgbClr val="4472C4"/>
                 </a:solidFill>
@@ -11453,7 +11441,7 @@
               </a:rPr>
               <a:t>Solution</a:t>
             </a:r>
-            <a:endParaRPr lang="en-US" sz="4800">
+            <a:endParaRPr lang="en-US" sz="4800" b="1" dirty="0">
               <a:solidFill>
                 <a:srgbClr val="4472C4"/>
               </a:solidFill>
@@ -11529,8 +11517,8 @@
         </p:blipFill>
         <p:spPr bwMode="auto">
           <a:xfrm>
-            <a:off x="2874495" y="1767623"/>
-            <a:ext cx="6443010" cy="3886794"/>
+            <a:off x="2947344" y="296473"/>
+            <a:ext cx="9019596" cy="5441139"/>
           </a:xfrm>
           <a:prstGeom prst="rect">
             <a:avLst/>
@@ -12991,7 +12979,7 @@
           <a:lstStyle/>
           <a:p>
             <a:r>
-              <a:rPr lang="en-US" sz="4800">
+              <a:rPr lang="en-US" sz="4800" b="1" dirty="0">
                 <a:solidFill>
                   <a:srgbClr val="4472C4"/>
                 </a:solidFill>
@@ -14605,46 +14593,6 @@
           <a:chExt cx="0" cy="0"/>
         </a:xfrm>
       </p:grpSpPr>
-      <p:sp>
-        <p:nvSpPr>
-          <p:cNvPr id="2" name="Title 1">
-            <a:extLst>
-              <a:ext uri="{FF2B5EF4-FFF2-40B4-BE49-F238E27FC236}">
-                <a16:creationId xmlns:a16="http://schemas.microsoft.com/office/drawing/2014/main" id="{57F12B21-0D0B-CE03-B98B-0B09A17B8002}"/>
-              </a:ext>
-            </a:extLst>
-          </p:cNvPr>
-          <p:cNvSpPr>
-            <a:spLocks noGrp="1"/>
-          </p:cNvSpPr>
-          <p:nvPr>
-            <p:ph type="title"/>
-          </p:nvPr>
-        </p:nvSpPr>
-        <p:spPr>
-          <a:xfrm>
-            <a:off x="838200" y="825976"/>
-            <a:ext cx="10515600" cy="1325563"/>
-          </a:xfrm>
-        </p:spPr>
-        <p:txBody>
-          <a:bodyPr/>
-          <a:lstStyle/>
-          <a:p>
-            <a:r>
-              <a:rPr lang="en-US" sz="4800">
-                <a:solidFill>
-                  <a:srgbClr val="4472C4"/>
-                </a:solidFill>
-                <a:latin typeface="Calibri Light" panose="020F0302020204030204" pitchFamily="34" charset="0"/>
-                <a:ea typeface="Yu Gothic Light" panose="020B0300000000000000" pitchFamily="34" charset="-128"/>
-                <a:cs typeface="Calibri Light" panose="020F0302020204030204" pitchFamily="34" charset="0"/>
-              </a:rPr>
-              <a:t>User interface</a:t>
-            </a:r>
-          </a:p>
-        </p:txBody>
-      </p:sp>
       <p:pic>
         <p:nvPicPr>
           <p:cNvPr id="5" name="Picture 4">
@@ -16216,6 +16164,46 @@
           </a:p>
         </p:txBody>
       </p:sp>
+      <p:sp>
+        <p:nvSpPr>
+          <p:cNvPr id="7" name="Title 1">
+            <a:extLst>
+              <a:ext uri="{FF2B5EF4-FFF2-40B4-BE49-F238E27FC236}">
+                <a16:creationId xmlns:a16="http://schemas.microsoft.com/office/drawing/2014/main" id="{DEAB5C3B-A4BB-207A-FD8E-49610363A69F}"/>
+              </a:ext>
+            </a:extLst>
+          </p:cNvPr>
+          <p:cNvSpPr>
+            <a:spLocks noGrp="1"/>
+          </p:cNvSpPr>
+          <p:nvPr>
+            <p:ph type="title"/>
+          </p:nvPr>
+        </p:nvSpPr>
+        <p:spPr>
+          <a:xfrm>
+            <a:off x="838200" y="825976"/>
+            <a:ext cx="10515600" cy="1140193"/>
+          </a:xfrm>
+        </p:spPr>
+        <p:txBody>
+          <a:bodyPr/>
+          <a:lstStyle/>
+          <a:p>
+            <a:r>
+              <a:rPr lang="en-US" sz="4800" b="1" dirty="0">
+                <a:solidFill>
+                  <a:srgbClr val="4472C4"/>
+                </a:solidFill>
+                <a:latin typeface="Calibri Light" panose="020F0302020204030204" pitchFamily="34" charset="0"/>
+                <a:ea typeface="Yu Gothic Light" panose="020B0300000000000000" pitchFamily="34" charset="-128"/>
+                <a:cs typeface="Calibri Light" panose="020F0302020204030204" pitchFamily="34" charset="0"/>
+              </a:rPr>
+              <a:t>User interface</a:t>
+            </a:r>
+          </a:p>
+        </p:txBody>
+      </p:sp>
     </p:spTree>
     <p:extLst>
       <p:ext uri="{BB962C8B-B14F-4D97-AF65-F5344CB8AC3E}">
@@ -16385,7 +16373,7 @@
           </a:lstStyle>
           <a:p>
             <a:r>
-              <a:rPr lang="en-US" sz="4800">
+              <a:rPr lang="en-US" sz="4800" b="1" dirty="0">
                 <a:solidFill>
                   <a:srgbClr val="4472C4"/>
                 </a:solidFill>
@@ -16395,7 +16383,7 @@
               </a:rPr>
               <a:t>Feasibility test</a:t>
             </a:r>
-            <a:endParaRPr lang="he-IL" sz="4800">
+            <a:endParaRPr lang="he-IL" sz="4800" b="1" dirty="0">
               <a:solidFill>
                 <a:srgbClr val="4472C4"/>
               </a:solidFill>
@@ -17994,7 +17982,7 @@
           </a:lstStyle>
           <a:p>
             <a:r>
-              <a:rPr lang="en-US" sz="4800">
+              <a:rPr lang="en-US" sz="4800" b="1" dirty="0">
                 <a:solidFill>
                   <a:srgbClr val="4472C4"/>
                 </a:solidFill>
@@ -18004,7 +17992,7 @@
               </a:rPr>
               <a:t>Feasibility test</a:t>
             </a:r>
-            <a:endParaRPr lang="he-IL" sz="4800">
+            <a:endParaRPr lang="he-IL" sz="4800" b="1" dirty="0">
               <a:solidFill>
                 <a:srgbClr val="4472C4"/>
               </a:solidFill>
@@ -20009,7 +19997,7 @@
           <a:lstStyle/>
           <a:p>
             <a:r>
-              <a:rPr lang="en-US" sz="4800">
+              <a:rPr lang="en-US" sz="4800" b="1" dirty="0">
                 <a:solidFill>
                   <a:srgbClr val="4472C4"/>
                 </a:solidFill>
@@ -20017,7 +20005,18 @@
                 <a:ea typeface="Yu Gothic Light" panose="020B0300000000000000" pitchFamily="34" charset="-128"/>
                 <a:cs typeface="Calibri Light" panose="020F0302020204030204" pitchFamily="34" charset="0"/>
               </a:rPr>
-              <a:t>Optimization </a:t>
+              <a:t>Optimization</a:t>
+            </a:r>
+            <a:r>
+              <a:rPr lang="en-US" sz="4800" dirty="0">
+                <a:solidFill>
+                  <a:srgbClr val="4472C4"/>
+                </a:solidFill>
+                <a:latin typeface="Calibri Light" panose="020F0302020204030204" pitchFamily="34" charset="0"/>
+                <a:ea typeface="Yu Gothic Light" panose="020B0300000000000000" pitchFamily="34" charset="-128"/>
+                <a:cs typeface="Calibri Light" panose="020F0302020204030204" pitchFamily="34" charset="0"/>
+              </a:rPr>
+              <a:t> </a:t>
             </a:r>
           </a:p>
         </p:txBody>
@@ -21558,7 +21557,7 @@
           <a:lstStyle/>
           <a:p>
             <a:r>
-              <a:rPr lang="en-US" sz="4800">
+              <a:rPr lang="en-US" sz="4800" b="1" dirty="0">
                 <a:solidFill>
                   <a:srgbClr val="4472C4"/>
                 </a:solidFill>
@@ -23107,7 +23106,7 @@
           <a:lstStyle/>
           <a:p>
             <a:r>
-              <a:rPr lang="en-US" sz="4800">
+              <a:rPr lang="en-US" sz="4800" b="1" dirty="0">
                 <a:solidFill>
                   <a:srgbClr val="4472C4"/>
                 </a:solidFill>
@@ -23115,9 +23114,20 @@
                 <a:ea typeface="Yu Gothic Light" panose="020B0300000000000000" pitchFamily="34" charset="-128"/>
                 <a:cs typeface="Calibri Light" panose="020F0302020204030204" pitchFamily="34" charset="0"/>
               </a:rPr>
-              <a:t>Introduction </a:t>
-            </a:r>
-            <a:endParaRPr lang="he-IL" sz="4800">
+              <a:t>Introduction</a:t>
+            </a:r>
+            <a:r>
+              <a:rPr lang="en-US" sz="4800" dirty="0">
+                <a:solidFill>
+                  <a:srgbClr val="4472C4"/>
+                </a:solidFill>
+                <a:latin typeface="Calibri Light" panose="020F0302020204030204" pitchFamily="34" charset="0"/>
+                <a:ea typeface="Yu Gothic Light" panose="020B0300000000000000" pitchFamily="34" charset="-128"/>
+                <a:cs typeface="Calibri Light" panose="020F0302020204030204" pitchFamily="34" charset="0"/>
+              </a:rPr>
+              <a:t> </a:t>
+            </a:r>
+            <a:endParaRPr lang="he-IL" sz="4800" dirty="0">
               <a:solidFill>
                 <a:srgbClr val="4472C4"/>
               </a:solidFill>
@@ -24855,7 +24865,7 @@
           <a:lstStyle/>
           <a:p>
             <a:r>
-              <a:rPr lang="en-US" sz="4800">
+              <a:rPr lang="en-US" sz="4800" b="1" dirty="0">
                 <a:solidFill>
                   <a:srgbClr val="4472C4"/>
                 </a:solidFill>
@@ -24865,7 +24875,7 @@
               </a:rPr>
               <a:t>Verification plan</a:t>
             </a:r>
-            <a:endParaRPr lang="en-US"/>
+            <a:endParaRPr lang="en-US" b="1" dirty="0"/>
           </a:p>
         </p:txBody>
       </p:sp>
@@ -27655,7 +27665,7 @@
           <a:lstStyle/>
           <a:p>
             <a:r>
-              <a:rPr lang="en-US" sz="4800">
+              <a:rPr lang="en-US" sz="4800" b="1" dirty="0">
                 <a:solidFill>
                   <a:srgbClr val="4472C4"/>
                 </a:solidFill>
@@ -29329,7 +29339,7 @@
           </a:lstStyle>
           <a:p>
             <a:r>
-              <a:rPr lang="en-US" sz="4800">
+              <a:rPr lang="en-US" sz="4800" b="1" dirty="0">
                 <a:solidFill>
                   <a:srgbClr val="4472C4"/>
                 </a:solidFill>
@@ -31209,7 +31219,7 @@
           </a:lstStyle>
           <a:p>
             <a:r>
-              <a:rPr lang="en-US" sz="4800">
+              <a:rPr lang="en-US" sz="4800" b="1" dirty="0">
                 <a:solidFill>
                   <a:srgbClr val="4472C4"/>
                 </a:solidFill>
@@ -31219,7 +31229,7 @@
               </a:rPr>
               <a:t>Bibliography</a:t>
             </a:r>
-            <a:endParaRPr lang="he-IL" sz="4800">
+            <a:endParaRPr lang="he-IL" sz="4800" b="1" dirty="0">
               <a:solidFill>
                 <a:srgbClr val="4472C4"/>
               </a:solidFill>
@@ -32545,7 +32555,7 @@
           <a:lstStyle/>
           <a:p>
             <a:r>
-              <a:rPr lang="en-US" sz="4800">
+              <a:rPr lang="en-US" sz="4800" b="1" dirty="0">
                 <a:solidFill>
                   <a:srgbClr val="4472C4"/>
                 </a:solidFill>
@@ -32555,7 +32565,18 @@
               </a:rPr>
               <a:t>Introduction</a:t>
             </a:r>
-            <a:endParaRPr lang="he-IL" sz="4800">
+            <a:r>
+              <a:rPr lang="en-US" sz="4800" dirty="0">
+                <a:solidFill>
+                  <a:srgbClr val="4472C4"/>
+                </a:solidFill>
+                <a:latin typeface="Calibri Light" panose="020F0302020204030204" pitchFamily="34" charset="0"/>
+                <a:ea typeface="Yu Gothic Light" panose="020B0300000000000000" pitchFamily="34" charset="-128"/>
+                <a:cs typeface="Calibri Light" panose="020F0302020204030204" pitchFamily="34" charset="0"/>
+              </a:rPr>
+              <a:t> </a:t>
+            </a:r>
+            <a:endParaRPr lang="he-IL" sz="4800" dirty="0">
               <a:solidFill>
                 <a:srgbClr val="4472C4"/>
               </a:solidFill>
@@ -32596,32 +32617,32 @@
           <a:p>
             <a:pPr algn="l" rtl="0"/>
             <a:r>
-              <a:rPr lang="en-US" sz="4000"/>
+              <a:rPr lang="en-US" sz="4000" dirty="0"/>
               <a:t>Direct calculations are computationally expensive</a:t>
             </a:r>
           </a:p>
           <a:p>
             <a:pPr algn="l" rtl="0"/>
             <a:r>
-              <a:rPr lang="en-US" sz="4000"/>
+              <a:rPr lang="en-US" sz="4000" dirty="0"/>
               <a:t>Faster algorithms need to be tested</a:t>
             </a:r>
           </a:p>
           <a:p>
             <a:pPr algn="l" rtl="0"/>
-            <a:endParaRPr lang="en-US" sz="4000"/>
+            <a:endParaRPr lang="en-US" sz="4000" dirty="0"/>
           </a:p>
           <a:p>
             <a:pPr algn="l" rtl="0"/>
             <a:r>
-              <a:rPr lang="en-US" sz="4000"/>
+              <a:rPr lang="en-US" sz="4000" dirty="0"/>
               <a:t>Implementing on a satellite on-board computer</a:t>
             </a:r>
           </a:p>
           <a:p>
             <a:pPr algn="l" rtl="0"/>
             <a:r>
-              <a:rPr lang="en-US" sz="4000"/>
+              <a:rPr lang="en-US" sz="4000" dirty="0"/>
               <a:t>Testing the algorithms</a:t>
             </a:r>
           </a:p>
@@ -32629,7 +32650,7 @@
             <a:pPr marL="0" indent="0" algn="l" rtl="0">
               <a:buNone/>
             </a:pPr>
-            <a:endParaRPr lang="he-IL" sz="4000"/>
+            <a:endParaRPr lang="he-IL" sz="4000" dirty="0"/>
           </a:p>
         </p:txBody>
       </p:sp>
@@ -34137,7 +34158,7 @@
           <a:lstStyle/>
           <a:p>
             <a:r>
-              <a:rPr lang="he-IL" sz="4800" err="1">
+              <a:rPr lang="he-IL" sz="4800" b="1" dirty="0">
                 <a:solidFill>
                   <a:srgbClr val="4472C4"/>
                 </a:solidFill>
@@ -34147,14 +34168,6 @@
               </a:rPr>
               <a:t>Background</a:t>
             </a:r>
-            <a:endParaRPr lang="he-IL" sz="4800">
-              <a:solidFill>
-                <a:srgbClr val="4472C4"/>
-              </a:solidFill>
-              <a:latin typeface="Calibri Light" panose="020F0302020204030204" pitchFamily="34" charset="0"/>
-              <a:ea typeface="Yu Gothic Light" panose="020B0300000000000000" pitchFamily="34" charset="-128"/>
-              <a:cs typeface="Calibri Light" panose="020F0302020204030204" pitchFamily="34" charset="0"/>
-            </a:endParaRPr>
           </a:p>
         </p:txBody>
       </p:sp>
@@ -35895,7 +35908,7 @@
           </a:lstStyle>
           <a:p>
             <a:r>
-              <a:rPr lang="he-IL" sz="4800">
+              <a:rPr lang="he-IL" sz="4800" b="1" dirty="0">
                 <a:solidFill>
                   <a:srgbClr val="4472C4"/>
                 </a:solidFill>
@@ -38122,7 +38135,7 @@
           </a:lstStyle>
           <a:p>
             <a:r>
-              <a:rPr lang="en-US" sz="4800">
+              <a:rPr lang="en-US" sz="4800" b="1" dirty="0">
                 <a:solidFill>
                   <a:srgbClr val="4472C4"/>
                 </a:solidFill>
@@ -38132,7 +38145,7 @@
               </a:rPr>
               <a:t>Algorithms</a:t>
             </a:r>
-            <a:endParaRPr lang="he-IL" sz="4800">
+            <a:endParaRPr lang="he-IL" sz="4800" b="1" dirty="0">
               <a:solidFill>
                 <a:srgbClr val="4472C4"/>
               </a:solidFill>
@@ -39757,7 +39770,7 @@
           </a:lstStyle>
           <a:p>
             <a:r>
-              <a:rPr lang="en-US" sz="4800">
+              <a:rPr lang="en-US" sz="4800" b="1" dirty="0">
                 <a:solidFill>
                   <a:srgbClr val="4472C4"/>
                 </a:solidFill>
@@ -39767,7 +39780,7 @@
               </a:rPr>
               <a:t>Algorithms</a:t>
             </a:r>
-            <a:endParaRPr lang="he-IL" sz="4800">
+            <a:endParaRPr lang="he-IL" sz="4800" b="1" dirty="0">
               <a:solidFill>
                 <a:srgbClr val="4472C4"/>
               </a:solidFill>
@@ -41369,7 +41382,7 @@
           </a:lstStyle>
           <a:p>
             <a:r>
-              <a:rPr lang="en-US" sz="4800">
+              <a:rPr lang="en-US" sz="4800" b="1" dirty="0">
                 <a:solidFill>
                   <a:srgbClr val="4472C4"/>
                 </a:solidFill>
@@ -41379,7 +41392,7 @@
               </a:rPr>
               <a:t>Algorithms</a:t>
             </a:r>
-            <a:endParaRPr lang="he-IL" sz="4800">
+            <a:endParaRPr lang="he-IL" sz="4800" b="1" dirty="0">
               <a:solidFill>
                 <a:srgbClr val="4472C4"/>
               </a:solidFill>
@@ -42957,7 +42970,7 @@
           </a:lstStyle>
           <a:p>
             <a:r>
-              <a:rPr lang="en-US" sz="4800">
+              <a:rPr lang="en-US" sz="4800" b="1" dirty="0">
                 <a:solidFill>
                   <a:srgbClr val="4472C4"/>
                 </a:solidFill>
@@ -42967,7 +42980,7 @@
               </a:rPr>
               <a:t>Problem</a:t>
             </a:r>
-            <a:endParaRPr lang="he-IL" sz="4800">
+            <a:endParaRPr lang="he-IL" sz="4800" b="1" dirty="0">
               <a:solidFill>
                 <a:srgbClr val="4472C4"/>
               </a:solidFill>
@@ -45461,6 +45474,21 @@
 </file>
 
 <file path=customXml/item1.xml><?xml version="1.0" encoding="utf-8"?>
+<p:properties xmlns:p="http://schemas.microsoft.com/office/2006/metadata/properties" xmlns:xsi="http://www.w3.org/2001/XMLSchema-instance" xmlns:pc="http://schemas.microsoft.com/office/infopath/2007/PartnerControls">
+  <documentManagement/>
+</p:properties>
+</file>
+
+<file path=customXml/item2.xml><?xml version="1.0" encoding="utf-8"?>
+<?mso-contentType ?>
+<FormTemplates xmlns="http://schemas.microsoft.com/sharepoint/v3/contenttype/forms">
+  <Display>DocumentLibraryForm</Display>
+  <Edit>DocumentLibraryForm</Edit>
+  <New>DocumentLibraryForm</New>
+</FormTemplates>
+</file>
+
+<file path=customXml/item3.xml><?xml version="1.0" encoding="utf-8"?>
 <ct:contentTypeSchema xmlns:ct="http://schemas.microsoft.com/office/2006/metadata/contentType" xmlns:ma="http://schemas.microsoft.com/office/2006/metadata/properties/metaAttributes" ct:_="" ma:_="" ma:contentTypeName="Document" ma:contentTypeID="0x010100BA8136A5775A284FB5A4EF83D37E3344" ma:contentTypeVersion="5" ma:contentTypeDescription="Create a new document." ma:contentTypeScope="" ma:versionID="e1f29ebee1d24d40d4b08f39309a0049">
   <xsd:schema xmlns:xsd="http://www.w3.org/2001/XMLSchema" xmlns:xs="http://www.w3.org/2001/XMLSchema" xmlns:p="http://schemas.microsoft.com/office/2006/metadata/properties" xmlns:ns2="9f82ceb4-6257-45e4-a8fb-3c70a82304d3" xmlns:ns3="4c7b9de7-e58c-4ace-87d5-9a60f3b223c2" targetNamespace="http://schemas.microsoft.com/office/2006/metadata/properties" ma:root="true" ma:fieldsID="9b02b89ee8a12de334557f117630db3a" ns2:_="" ns3:_="">
     <xsd:import namespace="9f82ceb4-6257-45e4-a8fb-3c70a82304d3"/>
@@ -45631,22 +45659,32 @@
 </ct:contentTypeSchema>
 </file>
 
-<file path=customXml/item2.xml><?xml version="1.0" encoding="utf-8"?>
-<?mso-contentType ?>
-<FormTemplates xmlns="http://schemas.microsoft.com/sharepoint/v3/contenttype/forms">
-  <Display>DocumentLibraryForm</Display>
-  <Edit>DocumentLibraryForm</Edit>
-  <New>DocumentLibraryForm</New>
-</FormTemplates>
+<file path=customXml/itemProps1.xml><?xml version="1.0" encoding="utf-8"?>
+<ds:datastoreItem xmlns:ds="http://schemas.openxmlformats.org/officeDocument/2006/customXml" ds:itemID="{1A5D468B-6206-47E4-A39B-51F47BC537E8}">
+  <ds:schemaRefs>
+    <ds:schemaRef ds:uri="http://schemas.openxmlformats.org/package/2006/metadata/core-properties"/>
+    <ds:schemaRef ds:uri="9f82ceb4-6257-45e4-a8fb-3c70a82304d3"/>
+    <ds:schemaRef ds:uri="http://schemas.microsoft.com/office/2006/documentManagement/types"/>
+    <ds:schemaRef ds:uri="http://schemas.microsoft.com/office/infopath/2007/PartnerControls"/>
+    <ds:schemaRef ds:uri="http://purl.org/dc/elements/1.1/"/>
+    <ds:schemaRef ds:uri="http://schemas.microsoft.com/office/2006/metadata/properties"/>
+    <ds:schemaRef ds:uri="http://purl.org/dc/terms/"/>
+    <ds:schemaRef ds:uri="4c7b9de7-e58c-4ace-87d5-9a60f3b223c2"/>
+    <ds:schemaRef ds:uri="http://www.w3.org/XML/1998/namespace"/>
+    <ds:schemaRef ds:uri="http://purl.org/dc/dcmitype/"/>
+  </ds:schemaRefs>
+</ds:datastoreItem>
 </file>
 
-<file path=customXml/item3.xml><?xml version="1.0" encoding="utf-8"?>
-<p:properties xmlns:p="http://schemas.microsoft.com/office/2006/metadata/properties" xmlns:xsi="http://www.w3.org/2001/XMLSchema-instance" xmlns:pc="http://schemas.microsoft.com/office/infopath/2007/PartnerControls">
-  <documentManagement/>
-</p:properties>
+<file path=customXml/itemProps2.xml><?xml version="1.0" encoding="utf-8"?>
+<ds:datastoreItem xmlns:ds="http://schemas.openxmlformats.org/officeDocument/2006/customXml" ds:itemID="{7733A369-0DEF-413E-AB3C-537D3682C87C}">
+  <ds:schemaRefs>
+    <ds:schemaRef ds:uri="http://schemas.microsoft.com/sharepoint/v3/contenttype/forms"/>
+  </ds:schemaRefs>
+</ds:datastoreItem>
 </file>
 
-<file path=customXml/itemProps1.xml><?xml version="1.0" encoding="utf-8"?>
+<file path=customXml/itemProps3.xml><?xml version="1.0" encoding="utf-8"?>
 <ds:datastoreItem xmlns:ds="http://schemas.openxmlformats.org/officeDocument/2006/customXml" ds:itemID="{2550B10C-B593-46DA-955D-601D44924E06}">
   <ds:schemaRefs>
     <ds:schemaRef ds:uri="4c7b9de7-e58c-4ace-87d5-9a60f3b223c2"/>
@@ -45663,29 +45701,4 @@
     <ds:schemaRef ds:uri="http://www.w3.org/2001/XMLSchema"/>
   </ds:schemaRefs>
 </ds:datastoreItem>
-</file>
-
-<file path=customXml/itemProps2.xml><?xml version="1.0" encoding="utf-8"?>
-<ds:datastoreItem xmlns:ds="http://schemas.openxmlformats.org/officeDocument/2006/customXml" ds:itemID="{7733A369-0DEF-413E-AB3C-537D3682C87C}">
-  <ds:schemaRefs>
-    <ds:schemaRef ds:uri="http://schemas.microsoft.com/sharepoint/v3/contenttype/forms"/>
-  </ds:schemaRefs>
-</ds:datastoreItem>
-</file>
-
-<file path=customXml/itemProps3.xml><?xml version="1.0" encoding="utf-8"?>
-<ds:datastoreItem xmlns:ds="http://schemas.openxmlformats.org/officeDocument/2006/customXml" ds:itemID="{1A5D468B-6206-47E4-A39B-51F47BC537E8}">
-  <ds:schemaRefs>
-    <ds:schemaRef ds:uri="http://schemas.openxmlformats.org/package/2006/metadata/core-properties"/>
-    <ds:schemaRef ds:uri="9f82ceb4-6257-45e4-a8fb-3c70a82304d3"/>
-    <ds:schemaRef ds:uri="http://schemas.microsoft.com/office/2006/documentManagement/types"/>
-    <ds:schemaRef ds:uri="http://schemas.microsoft.com/office/infopath/2007/PartnerControls"/>
-    <ds:schemaRef ds:uri="http://purl.org/dc/elements/1.1/"/>
-    <ds:schemaRef ds:uri="http://schemas.microsoft.com/office/2006/metadata/properties"/>
-    <ds:schemaRef ds:uri="http://purl.org/dc/terms/"/>
-    <ds:schemaRef ds:uri="4c7b9de7-e58c-4ace-87d5-9a60f3b223c2"/>
-    <ds:schemaRef ds:uri="http://www.w3.org/XML/1998/namespace"/>
-    <ds:schemaRef ds:uri="http://purl.org/dc/dcmitype/"/>
-  </ds:schemaRefs>
-</ds:datastoreItem>
 </file>
</xml_diff>